<commit_message>
updated documents and readme
</commit_message>
<xml_diff>
--- a/documents/webpage wireframe.pptx
+++ b/documents/webpage wireframe.pptx
@@ -6,6 +6,7 @@
   </p:sldMasterIdLst>
   <p:sldIdLst>
     <p:sldId id="256" r:id="rId2"/>
+    <p:sldId id="257" r:id="rId3"/>
   </p:sldIdLst>
   <p:sldSz cx="12192000" cy="6858000"/>
   <p:notesSz cx="6858000" cy="9144000"/>
@@ -104,6 +105,11 @@
       </a:defRPr>
     </a:lvl9pPr>
   </p:defaultTextStyle>
+  <p:extLst>
+    <p:ext uri="{EFAFB233-063F-42B5-8137-9DF3F51BA10A}">
+      <p15:sldGuideLst xmlns:p15="http://schemas.microsoft.com/office/powerpoint/2012/main"/>
+    </p:ext>
+  </p:extLst>
 </p:presentation>
 </file>
 
@@ -256,7 +262,7 @@
           <a:p>
             <a:fld id="{095FA38E-E404-405B-BEA9-254ACAD93F83}" type="datetimeFigureOut">
               <a:rPr lang="en-GB" smtClean="0"/>
-              <a:t>15/06/2020</a:t>
+              <a:t>16/07/2020</a:t>
             </a:fld>
             <a:endParaRPr lang="en-GB"/>
           </a:p>
@@ -456,7 +462,7 @@
           <a:p>
             <a:fld id="{095FA38E-E404-405B-BEA9-254ACAD93F83}" type="datetimeFigureOut">
               <a:rPr lang="en-GB" smtClean="0"/>
-              <a:t>15/06/2020</a:t>
+              <a:t>16/07/2020</a:t>
             </a:fld>
             <a:endParaRPr lang="en-GB"/>
           </a:p>
@@ -666,7 +672,7 @@
           <a:p>
             <a:fld id="{095FA38E-E404-405B-BEA9-254ACAD93F83}" type="datetimeFigureOut">
               <a:rPr lang="en-GB" smtClean="0"/>
-              <a:t>15/06/2020</a:t>
+              <a:t>16/07/2020</a:t>
             </a:fld>
             <a:endParaRPr lang="en-GB"/>
           </a:p>
@@ -866,7 +872,7 @@
           <a:p>
             <a:fld id="{095FA38E-E404-405B-BEA9-254ACAD93F83}" type="datetimeFigureOut">
               <a:rPr lang="en-GB" smtClean="0"/>
-              <a:t>15/06/2020</a:t>
+              <a:t>16/07/2020</a:t>
             </a:fld>
             <a:endParaRPr lang="en-GB"/>
           </a:p>
@@ -1142,7 +1148,7 @@
           <a:p>
             <a:fld id="{095FA38E-E404-405B-BEA9-254ACAD93F83}" type="datetimeFigureOut">
               <a:rPr lang="en-GB" smtClean="0"/>
-              <a:t>15/06/2020</a:t>
+              <a:t>16/07/2020</a:t>
             </a:fld>
             <a:endParaRPr lang="en-GB"/>
           </a:p>
@@ -1410,7 +1416,7 @@
           <a:p>
             <a:fld id="{095FA38E-E404-405B-BEA9-254ACAD93F83}" type="datetimeFigureOut">
               <a:rPr lang="en-GB" smtClean="0"/>
-              <a:t>15/06/2020</a:t>
+              <a:t>16/07/2020</a:t>
             </a:fld>
             <a:endParaRPr lang="en-GB"/>
           </a:p>
@@ -1825,7 +1831,7 @@
           <a:p>
             <a:fld id="{095FA38E-E404-405B-BEA9-254ACAD93F83}" type="datetimeFigureOut">
               <a:rPr lang="en-GB" smtClean="0"/>
-              <a:t>15/06/2020</a:t>
+              <a:t>16/07/2020</a:t>
             </a:fld>
             <a:endParaRPr lang="en-GB"/>
           </a:p>
@@ -1967,7 +1973,7 @@
           <a:p>
             <a:fld id="{095FA38E-E404-405B-BEA9-254ACAD93F83}" type="datetimeFigureOut">
               <a:rPr lang="en-GB" smtClean="0"/>
-              <a:t>15/06/2020</a:t>
+              <a:t>16/07/2020</a:t>
             </a:fld>
             <a:endParaRPr lang="en-GB"/>
           </a:p>
@@ -2080,7 +2086,7 @@
           <a:p>
             <a:fld id="{095FA38E-E404-405B-BEA9-254ACAD93F83}" type="datetimeFigureOut">
               <a:rPr lang="en-GB" smtClean="0"/>
-              <a:t>15/06/2020</a:t>
+              <a:t>16/07/2020</a:t>
             </a:fld>
             <a:endParaRPr lang="en-GB"/>
           </a:p>
@@ -2393,7 +2399,7 @@
           <a:p>
             <a:fld id="{095FA38E-E404-405B-BEA9-254ACAD93F83}" type="datetimeFigureOut">
               <a:rPr lang="en-GB" smtClean="0"/>
-              <a:t>15/06/2020</a:t>
+              <a:t>16/07/2020</a:t>
             </a:fld>
             <a:endParaRPr lang="en-GB"/>
           </a:p>
@@ -2682,7 +2688,7 @@
           <a:p>
             <a:fld id="{095FA38E-E404-405B-BEA9-254ACAD93F83}" type="datetimeFigureOut">
               <a:rPr lang="en-GB" smtClean="0"/>
-              <a:t>15/06/2020</a:t>
+              <a:t>16/07/2020</a:t>
             </a:fld>
             <a:endParaRPr lang="en-GB"/>
           </a:p>
@@ -2925,7 +2931,7 @@
           <a:p>
             <a:fld id="{095FA38E-E404-405B-BEA9-254ACAD93F83}" type="datetimeFigureOut">
               <a:rPr lang="en-GB" smtClean="0"/>
-              <a:t>15/06/2020</a:t>
+              <a:t>16/07/2020</a:t>
             </a:fld>
             <a:endParaRPr lang="en-GB"/>
           </a:p>
@@ -4054,6 +4060,1037 @@
 </p:sld>
 </file>
 
+<file path=ppt/slides/slide2.xml><?xml version="1.0" encoding="utf-8"?>
+<p:sld xmlns:a="http://schemas.openxmlformats.org/drawingml/2006/main" xmlns:r="http://schemas.openxmlformats.org/officeDocument/2006/relationships" xmlns:p="http://schemas.openxmlformats.org/presentationml/2006/main">
+  <p:cSld>
+    <p:spTree>
+      <p:nvGrpSpPr>
+        <p:cNvPr id="1" name=""/>
+        <p:cNvGrpSpPr/>
+        <p:nvPr/>
+      </p:nvGrpSpPr>
+      <p:grpSpPr>
+        <a:xfrm>
+          <a:off x="0" y="0"/>
+          <a:ext cx="0" cy="0"/>
+          <a:chOff x="0" y="0"/>
+          <a:chExt cx="0" cy="0"/>
+        </a:xfrm>
+      </p:grpSpPr>
+      <p:sp>
+        <p:nvSpPr>
+          <p:cNvPr id="2" name="Title 1">
+            <a:extLst>
+              <a:ext uri="{FF2B5EF4-FFF2-40B4-BE49-F238E27FC236}">
+                <a16:creationId xmlns:a16="http://schemas.microsoft.com/office/drawing/2014/main" id="{5E778CF1-6721-4AEE-BD9D-96E1B0493EA1}"/>
+              </a:ext>
+            </a:extLst>
+          </p:cNvPr>
+          <p:cNvSpPr>
+            <a:spLocks noGrp="1"/>
+          </p:cNvSpPr>
+          <p:nvPr>
+            <p:ph type="title"/>
+          </p:nvPr>
+        </p:nvSpPr>
+        <p:spPr>
+          <a:xfrm>
+            <a:off x="838200" y="436062"/>
+            <a:ext cx="10515600" cy="697688"/>
+          </a:xfrm>
+        </p:spPr>
+        <p:txBody>
+          <a:bodyPr/>
+          <a:lstStyle/>
+          <a:p>
+            <a:pPr algn="ctr"/>
+            <a:r>
+              <a:rPr lang="en-GB" dirty="0"/>
+              <a:t>Hobby Project</a:t>
+            </a:r>
+          </a:p>
+        </p:txBody>
+      </p:sp>
+      <p:sp>
+        <p:nvSpPr>
+          <p:cNvPr id="4" name="Rectangle 3">
+            <a:extLst>
+              <a:ext uri="{FF2B5EF4-FFF2-40B4-BE49-F238E27FC236}">
+                <a16:creationId xmlns:a16="http://schemas.microsoft.com/office/drawing/2014/main" id="{D48A511A-51FC-47AD-ADDA-EED99A80DA52}"/>
+              </a:ext>
+            </a:extLst>
+          </p:cNvPr>
+          <p:cNvSpPr/>
+          <p:nvPr/>
+        </p:nvSpPr>
+        <p:spPr>
+          <a:xfrm>
+            <a:off x="1928190" y="1443915"/>
+            <a:ext cx="1901687" cy="1762539"/>
+          </a:xfrm>
+          <a:prstGeom prst="rect">
+            <a:avLst/>
+          </a:prstGeom>
+        </p:spPr>
+        <p:style>
+          <a:lnRef idx="2">
+            <a:schemeClr val="accent6"/>
+          </a:lnRef>
+          <a:fillRef idx="1">
+            <a:schemeClr val="lt1"/>
+          </a:fillRef>
+          <a:effectRef idx="0">
+            <a:schemeClr val="accent6"/>
+          </a:effectRef>
+          <a:fontRef idx="minor">
+            <a:schemeClr val="dk1"/>
+          </a:fontRef>
+        </p:style>
+        <p:txBody>
+          <a:bodyPr rtlCol="0" anchor="ctr"/>
+          <a:lstStyle/>
+          <a:p>
+            <a:pPr algn="ctr"/>
+            <a:r>
+              <a:rPr lang="en-GB" dirty="0"/>
+              <a:t>Create</a:t>
+            </a:r>
+          </a:p>
+          <a:p>
+            <a:pPr algn="ctr"/>
+            <a:endParaRPr lang="en-GB" dirty="0"/>
+          </a:p>
+          <a:p>
+            <a:pPr algn="ctr"/>
+            <a:r>
+              <a:rPr lang="en-GB" dirty="0"/>
+              <a:t>Insert input : ……. </a:t>
+            </a:r>
+          </a:p>
+          <a:p>
+            <a:pPr algn="ctr"/>
+            <a:endParaRPr lang="en-GB" dirty="0"/>
+          </a:p>
+        </p:txBody>
+      </p:sp>
+      <p:sp>
+        <p:nvSpPr>
+          <p:cNvPr id="5" name="Rectangle 4">
+            <a:extLst>
+              <a:ext uri="{FF2B5EF4-FFF2-40B4-BE49-F238E27FC236}">
+                <a16:creationId xmlns:a16="http://schemas.microsoft.com/office/drawing/2014/main" id="{2759C606-90B9-4F5B-A180-FE2CE92B958A}"/>
+              </a:ext>
+            </a:extLst>
+          </p:cNvPr>
+          <p:cNvSpPr/>
+          <p:nvPr/>
+        </p:nvSpPr>
+        <p:spPr>
+          <a:xfrm>
+            <a:off x="4045226" y="1466195"/>
+            <a:ext cx="1901687" cy="1762539"/>
+          </a:xfrm>
+          <a:prstGeom prst="rect">
+            <a:avLst/>
+          </a:prstGeom>
+        </p:spPr>
+        <p:style>
+          <a:lnRef idx="2">
+            <a:schemeClr val="accent6"/>
+          </a:lnRef>
+          <a:fillRef idx="1">
+            <a:schemeClr val="lt1"/>
+          </a:fillRef>
+          <a:effectRef idx="0">
+            <a:schemeClr val="accent6"/>
+          </a:effectRef>
+          <a:fontRef idx="minor">
+            <a:schemeClr val="dk1"/>
+          </a:fontRef>
+        </p:style>
+        <p:txBody>
+          <a:bodyPr rtlCol="0" anchor="ctr"/>
+          <a:lstStyle/>
+          <a:p>
+            <a:pPr algn="ctr"/>
+            <a:r>
+              <a:rPr lang="en-GB" dirty="0"/>
+              <a:t>Read</a:t>
+            </a:r>
+          </a:p>
+          <a:p>
+            <a:pPr algn="ctr"/>
+            <a:r>
+              <a:rPr lang="en-GB" dirty="0"/>
+              <a:t>Which table? Insert table name:….</a:t>
+            </a:r>
+          </a:p>
+        </p:txBody>
+      </p:sp>
+      <p:sp>
+        <p:nvSpPr>
+          <p:cNvPr id="6" name="Rectangle 5">
+            <a:extLst>
+              <a:ext uri="{FF2B5EF4-FFF2-40B4-BE49-F238E27FC236}">
+                <a16:creationId xmlns:a16="http://schemas.microsoft.com/office/drawing/2014/main" id="{1A144821-FF6F-4B3B-8349-11A540CC4D59}"/>
+              </a:ext>
+            </a:extLst>
+          </p:cNvPr>
+          <p:cNvSpPr/>
+          <p:nvPr/>
+        </p:nvSpPr>
+        <p:spPr>
+          <a:xfrm>
+            <a:off x="6162263" y="1466195"/>
+            <a:ext cx="1762538" cy="1762539"/>
+          </a:xfrm>
+          <a:prstGeom prst="rect">
+            <a:avLst/>
+          </a:prstGeom>
+        </p:spPr>
+        <p:style>
+          <a:lnRef idx="2">
+            <a:schemeClr val="accent6"/>
+          </a:lnRef>
+          <a:fillRef idx="1">
+            <a:schemeClr val="lt1"/>
+          </a:fillRef>
+          <a:effectRef idx="0">
+            <a:schemeClr val="accent6"/>
+          </a:effectRef>
+          <a:fontRef idx="minor">
+            <a:schemeClr val="dk1"/>
+          </a:fontRef>
+        </p:style>
+        <p:txBody>
+          <a:bodyPr rtlCol="0" anchor="ctr"/>
+          <a:lstStyle/>
+          <a:p>
+            <a:pPr algn="ctr"/>
+            <a:r>
+              <a:rPr lang="en-GB" dirty="0"/>
+              <a:t>Update</a:t>
+            </a:r>
+          </a:p>
+          <a:p>
+            <a:pPr algn="ctr"/>
+            <a:r>
+              <a:rPr lang="en-GB" dirty="0"/>
+              <a:t>Enter Id to update: ……</a:t>
+            </a:r>
+          </a:p>
+        </p:txBody>
+      </p:sp>
+      <p:sp>
+        <p:nvSpPr>
+          <p:cNvPr id="7" name="Rectangle 6">
+            <a:extLst>
+              <a:ext uri="{FF2B5EF4-FFF2-40B4-BE49-F238E27FC236}">
+                <a16:creationId xmlns:a16="http://schemas.microsoft.com/office/drawing/2014/main" id="{C22026C0-297C-4AD9-82B5-EDACFF0BE5BC}"/>
+              </a:ext>
+            </a:extLst>
+          </p:cNvPr>
+          <p:cNvSpPr/>
+          <p:nvPr/>
+        </p:nvSpPr>
+        <p:spPr>
+          <a:xfrm>
+            <a:off x="8166655" y="1466195"/>
+            <a:ext cx="1560441" cy="1762539"/>
+          </a:xfrm>
+          <a:prstGeom prst="rect">
+            <a:avLst/>
+          </a:prstGeom>
+        </p:spPr>
+        <p:style>
+          <a:lnRef idx="2">
+            <a:schemeClr val="accent6"/>
+          </a:lnRef>
+          <a:fillRef idx="1">
+            <a:schemeClr val="lt1"/>
+          </a:fillRef>
+          <a:effectRef idx="0">
+            <a:schemeClr val="accent6"/>
+          </a:effectRef>
+          <a:fontRef idx="minor">
+            <a:schemeClr val="dk1"/>
+          </a:fontRef>
+        </p:style>
+        <p:txBody>
+          <a:bodyPr rtlCol="0" anchor="ctr"/>
+          <a:lstStyle/>
+          <a:p>
+            <a:pPr algn="ctr"/>
+            <a:r>
+              <a:rPr lang="en-GB" dirty="0"/>
+              <a:t>Delete</a:t>
+            </a:r>
+          </a:p>
+          <a:p>
+            <a:pPr algn="ctr"/>
+            <a:r>
+              <a:rPr lang="en-GB" dirty="0"/>
+              <a:t>Enter Id: …. </a:t>
+            </a:r>
+          </a:p>
+        </p:txBody>
+      </p:sp>
+      <p:sp>
+        <p:nvSpPr>
+          <p:cNvPr id="8" name="Rectangle 7">
+            <a:extLst>
+              <a:ext uri="{FF2B5EF4-FFF2-40B4-BE49-F238E27FC236}">
+                <a16:creationId xmlns:a16="http://schemas.microsoft.com/office/drawing/2014/main" id="{E7830987-1027-4B19-AC9B-203859AC0595}"/>
+              </a:ext>
+            </a:extLst>
+          </p:cNvPr>
+          <p:cNvSpPr/>
+          <p:nvPr/>
+        </p:nvSpPr>
+        <p:spPr>
+          <a:xfrm>
+            <a:off x="8502927" y="2876234"/>
+            <a:ext cx="887895" cy="281610"/>
+          </a:xfrm>
+          <a:prstGeom prst="rect">
+            <a:avLst/>
+          </a:prstGeom>
+        </p:spPr>
+        <p:style>
+          <a:lnRef idx="2">
+            <a:schemeClr val="accent1">
+              <a:shade val="50000"/>
+            </a:schemeClr>
+          </a:lnRef>
+          <a:fillRef idx="1">
+            <a:schemeClr val="accent1"/>
+          </a:fillRef>
+          <a:effectRef idx="0">
+            <a:schemeClr val="accent1"/>
+          </a:effectRef>
+          <a:fontRef idx="minor">
+            <a:schemeClr val="lt1"/>
+          </a:fontRef>
+        </p:style>
+        <p:txBody>
+          <a:bodyPr rtlCol="0" anchor="ctr"/>
+          <a:lstStyle/>
+          <a:p>
+            <a:pPr algn="ctr"/>
+            <a:r>
+              <a:rPr lang="en-GB" dirty="0"/>
+              <a:t>Submit</a:t>
+            </a:r>
+          </a:p>
+        </p:txBody>
+      </p:sp>
+      <p:sp>
+        <p:nvSpPr>
+          <p:cNvPr id="9" name="Rectangle 8">
+            <a:extLst>
+              <a:ext uri="{FF2B5EF4-FFF2-40B4-BE49-F238E27FC236}">
+                <a16:creationId xmlns:a16="http://schemas.microsoft.com/office/drawing/2014/main" id="{84C7934D-0584-4309-9940-A39C3C52DC07}"/>
+              </a:ext>
+            </a:extLst>
+          </p:cNvPr>
+          <p:cNvSpPr/>
+          <p:nvPr/>
+        </p:nvSpPr>
+        <p:spPr>
+          <a:xfrm>
+            <a:off x="6679096" y="2876234"/>
+            <a:ext cx="887895" cy="281610"/>
+          </a:xfrm>
+          <a:prstGeom prst="rect">
+            <a:avLst/>
+          </a:prstGeom>
+        </p:spPr>
+        <p:style>
+          <a:lnRef idx="2">
+            <a:schemeClr val="accent1">
+              <a:shade val="50000"/>
+            </a:schemeClr>
+          </a:lnRef>
+          <a:fillRef idx="1">
+            <a:schemeClr val="accent1"/>
+          </a:fillRef>
+          <a:effectRef idx="0">
+            <a:schemeClr val="accent1"/>
+          </a:effectRef>
+          <a:fontRef idx="minor">
+            <a:schemeClr val="lt1"/>
+          </a:fontRef>
+        </p:style>
+        <p:txBody>
+          <a:bodyPr rtlCol="0" anchor="ctr"/>
+          <a:lstStyle/>
+          <a:p>
+            <a:pPr algn="ctr"/>
+            <a:r>
+              <a:rPr lang="en-GB" dirty="0"/>
+              <a:t>Submit</a:t>
+            </a:r>
+          </a:p>
+        </p:txBody>
+      </p:sp>
+      <p:sp>
+        <p:nvSpPr>
+          <p:cNvPr id="10" name="Rectangle 9">
+            <a:extLst>
+              <a:ext uri="{FF2B5EF4-FFF2-40B4-BE49-F238E27FC236}">
+                <a16:creationId xmlns:a16="http://schemas.microsoft.com/office/drawing/2014/main" id="{DEDA1BB7-23B9-4F8C-A14D-6C399D612C57}"/>
+              </a:ext>
+            </a:extLst>
+          </p:cNvPr>
+          <p:cNvSpPr/>
+          <p:nvPr/>
+        </p:nvSpPr>
+        <p:spPr>
+          <a:xfrm>
+            <a:off x="4452730" y="2879544"/>
+            <a:ext cx="887895" cy="281610"/>
+          </a:xfrm>
+          <a:prstGeom prst="rect">
+            <a:avLst/>
+          </a:prstGeom>
+        </p:spPr>
+        <p:style>
+          <a:lnRef idx="2">
+            <a:schemeClr val="accent1">
+              <a:shade val="50000"/>
+            </a:schemeClr>
+          </a:lnRef>
+          <a:fillRef idx="1">
+            <a:schemeClr val="accent1"/>
+          </a:fillRef>
+          <a:effectRef idx="0">
+            <a:schemeClr val="accent1"/>
+          </a:effectRef>
+          <a:fontRef idx="minor">
+            <a:schemeClr val="lt1"/>
+          </a:fontRef>
+        </p:style>
+        <p:txBody>
+          <a:bodyPr rtlCol="0" anchor="ctr"/>
+          <a:lstStyle/>
+          <a:p>
+            <a:pPr algn="ctr"/>
+            <a:r>
+              <a:rPr lang="en-GB" dirty="0"/>
+              <a:t>Submit</a:t>
+            </a:r>
+          </a:p>
+        </p:txBody>
+      </p:sp>
+      <p:sp>
+        <p:nvSpPr>
+          <p:cNvPr id="11" name="Rectangle 10">
+            <a:extLst>
+              <a:ext uri="{FF2B5EF4-FFF2-40B4-BE49-F238E27FC236}">
+                <a16:creationId xmlns:a16="http://schemas.microsoft.com/office/drawing/2014/main" id="{588EAD7A-E6C1-425B-81D6-E03ECFAA48F6}"/>
+              </a:ext>
+            </a:extLst>
+          </p:cNvPr>
+          <p:cNvSpPr/>
+          <p:nvPr/>
+        </p:nvSpPr>
+        <p:spPr>
+          <a:xfrm>
+            <a:off x="2143539" y="2735429"/>
+            <a:ext cx="887895" cy="281610"/>
+          </a:xfrm>
+          <a:prstGeom prst="rect">
+            <a:avLst/>
+          </a:prstGeom>
+        </p:spPr>
+        <p:style>
+          <a:lnRef idx="2">
+            <a:schemeClr val="accent1">
+              <a:shade val="50000"/>
+            </a:schemeClr>
+          </a:lnRef>
+          <a:fillRef idx="1">
+            <a:schemeClr val="accent1"/>
+          </a:fillRef>
+          <a:effectRef idx="0">
+            <a:schemeClr val="accent1"/>
+          </a:effectRef>
+          <a:fontRef idx="minor">
+            <a:schemeClr val="lt1"/>
+          </a:fontRef>
+        </p:style>
+        <p:txBody>
+          <a:bodyPr rtlCol="0" anchor="ctr"/>
+          <a:lstStyle/>
+          <a:p>
+            <a:pPr algn="ctr"/>
+            <a:r>
+              <a:rPr lang="en-GB" dirty="0"/>
+              <a:t>Submit</a:t>
+            </a:r>
+          </a:p>
+        </p:txBody>
+      </p:sp>
+      <p:sp>
+        <p:nvSpPr>
+          <p:cNvPr id="12" name="Title 1">
+            <a:extLst>
+              <a:ext uri="{FF2B5EF4-FFF2-40B4-BE49-F238E27FC236}">
+                <a16:creationId xmlns:a16="http://schemas.microsoft.com/office/drawing/2014/main" id="{E72D0693-E63C-4763-8ABE-E6E8F5B28EF7}"/>
+              </a:ext>
+            </a:extLst>
+          </p:cNvPr>
+          <p:cNvSpPr txBox="1">
+            <a:spLocks/>
+          </p:cNvSpPr>
+          <p:nvPr/>
+        </p:nvSpPr>
+        <p:spPr>
+          <a:xfrm>
+            <a:off x="354496" y="3516619"/>
+            <a:ext cx="10515600" cy="697688"/>
+          </a:xfrm>
+          <a:prstGeom prst="rect">
+            <a:avLst/>
+          </a:prstGeom>
+          <a:ln>
+            <a:solidFill>
+              <a:schemeClr val="tx1"/>
+            </a:solidFill>
+          </a:ln>
+        </p:spPr>
+        <p:txBody>
+          <a:bodyPr vert="horz" lIns="91440" tIns="45720" rIns="91440" bIns="45720" rtlCol="0" anchor="ctr">
+            <a:normAutofit/>
+          </a:bodyPr>
+          <a:lstStyle>
+            <a:lvl1pPr algn="l" defTabSz="914400" rtl="0" eaLnBrk="1" latinLnBrk="0" hangingPunct="1">
+              <a:lnSpc>
+                <a:spcPct val="90000"/>
+              </a:lnSpc>
+              <a:spcBef>
+                <a:spcPct val="0"/>
+              </a:spcBef>
+              <a:buNone/>
+              <a:defRPr sz="4400" kern="1200">
+                <a:solidFill>
+                  <a:schemeClr val="tx1"/>
+                </a:solidFill>
+                <a:latin typeface="+mj-lt"/>
+                <a:ea typeface="+mj-ea"/>
+                <a:cs typeface="+mj-cs"/>
+              </a:defRPr>
+            </a:lvl1pPr>
+          </a:lstStyle>
+          <a:p>
+            <a:pPr algn="ctr"/>
+            <a:endParaRPr lang="en-GB" dirty="0"/>
+          </a:p>
+        </p:txBody>
+      </p:sp>
+      <p:sp>
+        <p:nvSpPr>
+          <p:cNvPr id="20" name="Rectangle 19">
+            <a:extLst>
+              <a:ext uri="{FF2B5EF4-FFF2-40B4-BE49-F238E27FC236}">
+                <a16:creationId xmlns:a16="http://schemas.microsoft.com/office/drawing/2014/main" id="{CD4CFFA4-095C-4A9A-86D4-B237121FC31F}"/>
+              </a:ext>
+            </a:extLst>
+          </p:cNvPr>
+          <p:cNvSpPr/>
+          <p:nvPr/>
+        </p:nvSpPr>
+        <p:spPr>
+          <a:xfrm>
+            <a:off x="1686336" y="4812357"/>
+            <a:ext cx="1901687" cy="1762539"/>
+          </a:xfrm>
+          <a:prstGeom prst="rect">
+            <a:avLst/>
+          </a:prstGeom>
+        </p:spPr>
+        <p:style>
+          <a:lnRef idx="2">
+            <a:schemeClr val="accent6"/>
+          </a:lnRef>
+          <a:fillRef idx="1">
+            <a:schemeClr val="lt1"/>
+          </a:fillRef>
+          <a:effectRef idx="0">
+            <a:schemeClr val="accent6"/>
+          </a:effectRef>
+          <a:fontRef idx="minor">
+            <a:schemeClr val="dk1"/>
+          </a:fontRef>
+        </p:style>
+        <p:txBody>
+          <a:bodyPr rtlCol="0" anchor="ctr"/>
+          <a:lstStyle/>
+          <a:p>
+            <a:pPr algn="ctr"/>
+            <a:r>
+              <a:rPr lang="en-GB" dirty="0"/>
+              <a:t>Create</a:t>
+            </a:r>
+          </a:p>
+          <a:p>
+            <a:pPr algn="ctr"/>
+            <a:endParaRPr lang="en-GB" dirty="0"/>
+          </a:p>
+          <a:p>
+            <a:pPr algn="ctr"/>
+            <a:r>
+              <a:rPr lang="en-GB" dirty="0"/>
+              <a:t>Insert input : ……. </a:t>
+            </a:r>
+          </a:p>
+          <a:p>
+            <a:pPr algn="ctr"/>
+            <a:endParaRPr lang="en-GB" dirty="0"/>
+          </a:p>
+        </p:txBody>
+      </p:sp>
+      <p:sp>
+        <p:nvSpPr>
+          <p:cNvPr id="21" name="Rectangle 20">
+            <a:extLst>
+              <a:ext uri="{FF2B5EF4-FFF2-40B4-BE49-F238E27FC236}">
+                <a16:creationId xmlns:a16="http://schemas.microsoft.com/office/drawing/2014/main" id="{A3536461-C71D-45AC-BFCE-D482EAE16620}"/>
+              </a:ext>
+            </a:extLst>
+          </p:cNvPr>
+          <p:cNvSpPr/>
+          <p:nvPr/>
+        </p:nvSpPr>
+        <p:spPr>
+          <a:xfrm>
+            <a:off x="3803372" y="4834637"/>
+            <a:ext cx="1901687" cy="1762539"/>
+          </a:xfrm>
+          <a:prstGeom prst="rect">
+            <a:avLst/>
+          </a:prstGeom>
+        </p:spPr>
+        <p:style>
+          <a:lnRef idx="2">
+            <a:schemeClr val="accent6"/>
+          </a:lnRef>
+          <a:fillRef idx="1">
+            <a:schemeClr val="lt1"/>
+          </a:fillRef>
+          <a:effectRef idx="0">
+            <a:schemeClr val="accent6"/>
+          </a:effectRef>
+          <a:fontRef idx="minor">
+            <a:schemeClr val="dk1"/>
+          </a:fontRef>
+        </p:style>
+        <p:txBody>
+          <a:bodyPr rtlCol="0" anchor="ctr"/>
+          <a:lstStyle/>
+          <a:p>
+            <a:pPr algn="ctr"/>
+            <a:r>
+              <a:rPr lang="en-GB" dirty="0"/>
+              <a:t>Read</a:t>
+            </a:r>
+          </a:p>
+          <a:p>
+            <a:pPr algn="ctr"/>
+            <a:r>
+              <a:rPr lang="en-GB" dirty="0"/>
+              <a:t>Which table? Insert table name:….</a:t>
+            </a:r>
+          </a:p>
+        </p:txBody>
+      </p:sp>
+      <p:sp>
+        <p:nvSpPr>
+          <p:cNvPr id="22" name="Rectangle 21">
+            <a:extLst>
+              <a:ext uri="{FF2B5EF4-FFF2-40B4-BE49-F238E27FC236}">
+                <a16:creationId xmlns:a16="http://schemas.microsoft.com/office/drawing/2014/main" id="{52C033B2-57B5-438A-9FB4-BCCD5B2C86B1}"/>
+              </a:ext>
+            </a:extLst>
+          </p:cNvPr>
+          <p:cNvSpPr/>
+          <p:nvPr/>
+        </p:nvSpPr>
+        <p:spPr>
+          <a:xfrm>
+            <a:off x="5920409" y="4834637"/>
+            <a:ext cx="1762538" cy="1762539"/>
+          </a:xfrm>
+          <a:prstGeom prst="rect">
+            <a:avLst/>
+          </a:prstGeom>
+        </p:spPr>
+        <p:style>
+          <a:lnRef idx="2">
+            <a:schemeClr val="accent6"/>
+          </a:lnRef>
+          <a:fillRef idx="1">
+            <a:schemeClr val="lt1"/>
+          </a:fillRef>
+          <a:effectRef idx="0">
+            <a:schemeClr val="accent6"/>
+          </a:effectRef>
+          <a:fontRef idx="minor">
+            <a:schemeClr val="dk1"/>
+          </a:fontRef>
+        </p:style>
+        <p:txBody>
+          <a:bodyPr rtlCol="0" anchor="ctr"/>
+          <a:lstStyle/>
+          <a:p>
+            <a:pPr algn="ctr"/>
+            <a:r>
+              <a:rPr lang="en-GB" dirty="0"/>
+              <a:t>Update</a:t>
+            </a:r>
+          </a:p>
+          <a:p>
+            <a:pPr algn="ctr"/>
+            <a:r>
+              <a:rPr lang="en-GB" dirty="0"/>
+              <a:t>Enter Id to update: ……</a:t>
+            </a:r>
+          </a:p>
+        </p:txBody>
+      </p:sp>
+      <p:sp>
+        <p:nvSpPr>
+          <p:cNvPr id="23" name="Rectangle 22">
+            <a:extLst>
+              <a:ext uri="{FF2B5EF4-FFF2-40B4-BE49-F238E27FC236}">
+                <a16:creationId xmlns:a16="http://schemas.microsoft.com/office/drawing/2014/main" id="{84BF1D85-9352-43C9-AE21-71A54EFE1D3C}"/>
+              </a:ext>
+            </a:extLst>
+          </p:cNvPr>
+          <p:cNvSpPr/>
+          <p:nvPr/>
+        </p:nvSpPr>
+        <p:spPr>
+          <a:xfrm>
+            <a:off x="7924801" y="4834637"/>
+            <a:ext cx="1560441" cy="1762539"/>
+          </a:xfrm>
+          <a:prstGeom prst="rect">
+            <a:avLst/>
+          </a:prstGeom>
+        </p:spPr>
+        <p:style>
+          <a:lnRef idx="2">
+            <a:schemeClr val="accent6"/>
+          </a:lnRef>
+          <a:fillRef idx="1">
+            <a:schemeClr val="lt1"/>
+          </a:fillRef>
+          <a:effectRef idx="0">
+            <a:schemeClr val="accent6"/>
+          </a:effectRef>
+          <a:fontRef idx="minor">
+            <a:schemeClr val="dk1"/>
+          </a:fontRef>
+        </p:style>
+        <p:txBody>
+          <a:bodyPr rtlCol="0" anchor="ctr"/>
+          <a:lstStyle/>
+          <a:p>
+            <a:pPr algn="ctr"/>
+            <a:r>
+              <a:rPr lang="en-GB" dirty="0"/>
+              <a:t>Delete</a:t>
+            </a:r>
+          </a:p>
+          <a:p>
+            <a:pPr algn="ctr"/>
+            <a:r>
+              <a:rPr lang="en-GB" dirty="0"/>
+              <a:t>Enter Id: …. </a:t>
+            </a:r>
+          </a:p>
+        </p:txBody>
+      </p:sp>
+      <p:sp>
+        <p:nvSpPr>
+          <p:cNvPr id="24" name="Rectangle 23">
+            <a:extLst>
+              <a:ext uri="{FF2B5EF4-FFF2-40B4-BE49-F238E27FC236}">
+                <a16:creationId xmlns:a16="http://schemas.microsoft.com/office/drawing/2014/main" id="{AEA332BE-F87B-49CA-A062-4CA5BDC24E1C}"/>
+              </a:ext>
+            </a:extLst>
+          </p:cNvPr>
+          <p:cNvSpPr/>
+          <p:nvPr/>
+        </p:nvSpPr>
+        <p:spPr>
+          <a:xfrm>
+            <a:off x="8261073" y="6244676"/>
+            <a:ext cx="887895" cy="281610"/>
+          </a:xfrm>
+          <a:prstGeom prst="rect">
+            <a:avLst/>
+          </a:prstGeom>
+        </p:spPr>
+        <p:style>
+          <a:lnRef idx="2">
+            <a:schemeClr val="accent1">
+              <a:shade val="50000"/>
+            </a:schemeClr>
+          </a:lnRef>
+          <a:fillRef idx="1">
+            <a:schemeClr val="accent1"/>
+          </a:fillRef>
+          <a:effectRef idx="0">
+            <a:schemeClr val="accent1"/>
+          </a:effectRef>
+          <a:fontRef idx="minor">
+            <a:schemeClr val="lt1"/>
+          </a:fontRef>
+        </p:style>
+        <p:txBody>
+          <a:bodyPr rtlCol="0" anchor="ctr"/>
+          <a:lstStyle/>
+          <a:p>
+            <a:pPr algn="ctr"/>
+            <a:r>
+              <a:rPr lang="en-GB" dirty="0"/>
+              <a:t>Submit</a:t>
+            </a:r>
+          </a:p>
+        </p:txBody>
+      </p:sp>
+      <p:sp>
+        <p:nvSpPr>
+          <p:cNvPr id="25" name="Rectangle 24">
+            <a:extLst>
+              <a:ext uri="{FF2B5EF4-FFF2-40B4-BE49-F238E27FC236}">
+                <a16:creationId xmlns:a16="http://schemas.microsoft.com/office/drawing/2014/main" id="{B2F25B60-BD4A-45E4-9B03-A0E58328AF3B}"/>
+              </a:ext>
+            </a:extLst>
+          </p:cNvPr>
+          <p:cNvSpPr/>
+          <p:nvPr/>
+        </p:nvSpPr>
+        <p:spPr>
+          <a:xfrm>
+            <a:off x="6437242" y="6244676"/>
+            <a:ext cx="887895" cy="281610"/>
+          </a:xfrm>
+          <a:prstGeom prst="rect">
+            <a:avLst/>
+          </a:prstGeom>
+        </p:spPr>
+        <p:style>
+          <a:lnRef idx="2">
+            <a:schemeClr val="accent1">
+              <a:shade val="50000"/>
+            </a:schemeClr>
+          </a:lnRef>
+          <a:fillRef idx="1">
+            <a:schemeClr val="accent1"/>
+          </a:fillRef>
+          <a:effectRef idx="0">
+            <a:schemeClr val="accent1"/>
+          </a:effectRef>
+          <a:fontRef idx="minor">
+            <a:schemeClr val="lt1"/>
+          </a:fontRef>
+        </p:style>
+        <p:txBody>
+          <a:bodyPr rtlCol="0" anchor="ctr"/>
+          <a:lstStyle/>
+          <a:p>
+            <a:pPr algn="ctr"/>
+            <a:r>
+              <a:rPr lang="en-GB" dirty="0"/>
+              <a:t>Submit</a:t>
+            </a:r>
+          </a:p>
+        </p:txBody>
+      </p:sp>
+      <p:sp>
+        <p:nvSpPr>
+          <p:cNvPr id="26" name="Rectangle 25">
+            <a:extLst>
+              <a:ext uri="{FF2B5EF4-FFF2-40B4-BE49-F238E27FC236}">
+                <a16:creationId xmlns:a16="http://schemas.microsoft.com/office/drawing/2014/main" id="{C6C185FD-C0EE-431C-BE41-FDAC72E5B8EA}"/>
+              </a:ext>
+            </a:extLst>
+          </p:cNvPr>
+          <p:cNvSpPr/>
+          <p:nvPr/>
+        </p:nvSpPr>
+        <p:spPr>
+          <a:xfrm>
+            <a:off x="4210876" y="6247986"/>
+            <a:ext cx="887895" cy="281610"/>
+          </a:xfrm>
+          <a:prstGeom prst="rect">
+            <a:avLst/>
+          </a:prstGeom>
+        </p:spPr>
+        <p:style>
+          <a:lnRef idx="2">
+            <a:schemeClr val="accent1">
+              <a:shade val="50000"/>
+            </a:schemeClr>
+          </a:lnRef>
+          <a:fillRef idx="1">
+            <a:schemeClr val="accent1"/>
+          </a:fillRef>
+          <a:effectRef idx="0">
+            <a:schemeClr val="accent1"/>
+          </a:effectRef>
+          <a:fontRef idx="minor">
+            <a:schemeClr val="lt1"/>
+          </a:fontRef>
+        </p:style>
+        <p:txBody>
+          <a:bodyPr rtlCol="0" anchor="ctr"/>
+          <a:lstStyle/>
+          <a:p>
+            <a:pPr algn="ctr"/>
+            <a:r>
+              <a:rPr lang="en-GB" dirty="0"/>
+              <a:t>Submit</a:t>
+            </a:r>
+          </a:p>
+        </p:txBody>
+      </p:sp>
+      <p:sp>
+        <p:nvSpPr>
+          <p:cNvPr id="27" name="Rectangle 26">
+            <a:extLst>
+              <a:ext uri="{FF2B5EF4-FFF2-40B4-BE49-F238E27FC236}">
+                <a16:creationId xmlns:a16="http://schemas.microsoft.com/office/drawing/2014/main" id="{B4E9AE14-5CED-426B-82EA-DD4F394F22E7}"/>
+              </a:ext>
+            </a:extLst>
+          </p:cNvPr>
+          <p:cNvSpPr/>
+          <p:nvPr/>
+        </p:nvSpPr>
+        <p:spPr>
+          <a:xfrm>
+            <a:off x="1901685" y="6103871"/>
+            <a:ext cx="887895" cy="281610"/>
+          </a:xfrm>
+          <a:prstGeom prst="rect">
+            <a:avLst/>
+          </a:prstGeom>
+        </p:spPr>
+        <p:style>
+          <a:lnRef idx="2">
+            <a:schemeClr val="accent1">
+              <a:shade val="50000"/>
+            </a:schemeClr>
+          </a:lnRef>
+          <a:fillRef idx="1">
+            <a:schemeClr val="accent1"/>
+          </a:fillRef>
+          <a:effectRef idx="0">
+            <a:schemeClr val="accent1"/>
+          </a:effectRef>
+          <a:fontRef idx="minor">
+            <a:schemeClr val="lt1"/>
+          </a:fontRef>
+        </p:style>
+        <p:txBody>
+          <a:bodyPr rtlCol="0" anchor="ctr"/>
+          <a:lstStyle/>
+          <a:p>
+            <a:pPr algn="ctr"/>
+            <a:r>
+              <a:rPr lang="en-GB" dirty="0"/>
+              <a:t>Submit</a:t>
+            </a:r>
+          </a:p>
+        </p:txBody>
+      </p:sp>
+      <p:sp>
+        <p:nvSpPr>
+          <p:cNvPr id="28" name="TextBox 27">
+            <a:extLst>
+              <a:ext uri="{FF2B5EF4-FFF2-40B4-BE49-F238E27FC236}">
+                <a16:creationId xmlns:a16="http://schemas.microsoft.com/office/drawing/2014/main" id="{82A66C54-1280-44E1-ACC1-9C3EA0B45A99}"/>
+              </a:ext>
+            </a:extLst>
+          </p:cNvPr>
+          <p:cNvSpPr txBox="1"/>
+          <p:nvPr/>
+        </p:nvSpPr>
+        <p:spPr>
+          <a:xfrm>
+            <a:off x="1192696" y="4346713"/>
+            <a:ext cx="6374295" cy="369332"/>
+          </a:xfrm>
+          <a:prstGeom prst="rect">
+            <a:avLst/>
+          </a:prstGeom>
+          <a:noFill/>
+        </p:spPr>
+        <p:txBody>
+          <a:bodyPr wrap="square" rtlCol="0">
+            <a:spAutoFit/>
+          </a:bodyPr>
+          <a:lstStyle/>
+          <a:p>
+            <a:r>
+              <a:rPr lang="en-GB" dirty="0"/>
+              <a:t>Universe</a:t>
+            </a:r>
+          </a:p>
+        </p:txBody>
+      </p:sp>
+      <p:sp>
+        <p:nvSpPr>
+          <p:cNvPr id="29" name="TextBox 28">
+            <a:extLst>
+              <a:ext uri="{FF2B5EF4-FFF2-40B4-BE49-F238E27FC236}">
+                <a16:creationId xmlns:a16="http://schemas.microsoft.com/office/drawing/2014/main" id="{5ED31077-B790-4420-81ED-777A3787DD17}"/>
+              </a:ext>
+            </a:extLst>
+          </p:cNvPr>
+          <p:cNvSpPr txBox="1"/>
+          <p:nvPr/>
+        </p:nvSpPr>
+        <p:spPr>
+          <a:xfrm>
+            <a:off x="1023728" y="987209"/>
+            <a:ext cx="6374295" cy="369332"/>
+          </a:xfrm>
+          <a:prstGeom prst="rect">
+            <a:avLst/>
+          </a:prstGeom>
+          <a:noFill/>
+        </p:spPr>
+        <p:txBody>
+          <a:bodyPr wrap="square" rtlCol="0">
+            <a:spAutoFit/>
+          </a:bodyPr>
+          <a:lstStyle/>
+          <a:p>
+            <a:r>
+              <a:rPr lang="en-GB" dirty="0"/>
+              <a:t>Comic</a:t>
+            </a:r>
+          </a:p>
+        </p:txBody>
+      </p:sp>
+    </p:spTree>
+    <p:extLst>
+      <p:ext uri="{BB962C8B-B14F-4D97-AF65-F5344CB8AC3E}">
+        <p14:creationId xmlns:p14="http://schemas.microsoft.com/office/powerpoint/2010/main" val="2507946616"/>
+      </p:ext>
+    </p:extLst>
+  </p:cSld>
+  <p:clrMapOvr>
+    <a:masterClrMapping/>
+  </p:clrMapOvr>
+</p:sld>
+</file>
+
 <file path=ppt/theme/theme1.xml><?xml version="1.0" encoding="utf-8"?>
 <a:theme xmlns:a="http://schemas.openxmlformats.org/drawingml/2006/main" name="Office Theme">
   <a:themeElements>

</xml_diff>